<commit_message>
Clarify proposed exp followup for NCI proj
</commit_message>
<xml_diff>
--- a/presentations/weekly_meetings/2025_1_30.pptx
+++ b/presentations/weekly_meetings/2025_1_30.pptx
@@ -5,15 +5,16 @@
     <p:sldMasterId id="2147483648" r:id="rId1"/>
   </p:sldMasterIdLst>
   <p:notesMasterIdLst>
-    <p:notesMasterId r:id="rId8"/>
+    <p:notesMasterId r:id="rId9"/>
   </p:notesMasterIdLst>
   <p:sldIdLst>
     <p:sldId id="477" r:id="rId2"/>
     <p:sldId id="754" r:id="rId3"/>
-    <p:sldId id="809" r:id="rId4"/>
-    <p:sldId id="806" r:id="rId5"/>
-    <p:sldId id="807" r:id="rId6"/>
-    <p:sldId id="808" r:id="rId7"/>
+    <p:sldId id="810" r:id="rId4"/>
+    <p:sldId id="809" r:id="rId5"/>
+    <p:sldId id="806" r:id="rId6"/>
+    <p:sldId id="807" r:id="rId7"/>
+    <p:sldId id="808" r:id="rId8"/>
   </p:sldIdLst>
   <p:sldSz cx="12192000" cy="6858000"/>
   <p:notesSz cx="6858000" cy="9144000"/>
@@ -706,6 +707,206 @@
         <p:cNvPr id="1" name="">
           <a:extLst>
             <a:ext uri="{FF2B5EF4-FFF2-40B4-BE49-F238E27FC236}">
+              <a16:creationId xmlns:a16="http://schemas.microsoft.com/office/drawing/2014/main" id="{844078C0-9C1D-0B46-EBC8-ED81AE1FC563}"/>
+            </a:ext>
+          </a:extLst>
+        </p:cNvPr>
+        <p:cNvGrpSpPr/>
+        <p:nvPr/>
+      </p:nvGrpSpPr>
+      <p:grpSpPr>
+        <a:xfrm>
+          <a:off x="0" y="0"/>
+          <a:ext cx="0" cy="0"/>
+          <a:chOff x="0" y="0"/>
+          <a:chExt cx="0" cy="0"/>
+        </a:xfrm>
+      </p:grpSpPr>
+      <p:sp>
+        <p:nvSpPr>
+          <p:cNvPr id="2" name="Slide Image Placeholder 1">
+            <a:extLst>
+              <a:ext uri="{FF2B5EF4-FFF2-40B4-BE49-F238E27FC236}">
+                <a16:creationId xmlns:a16="http://schemas.microsoft.com/office/drawing/2014/main" id="{2E2F6A00-800E-F23A-FD51-D23CD2B77677}"/>
+              </a:ext>
+            </a:extLst>
+          </p:cNvPr>
+          <p:cNvSpPr>
+            <a:spLocks noGrp="1" noRot="1" noChangeAspect="1"/>
+          </p:cNvSpPr>
+          <p:nvPr>
+            <p:ph type="sldImg"/>
+          </p:nvPr>
+        </p:nvSpPr>
+        <p:spPr/>
+      </p:sp>
+      <p:sp>
+        <p:nvSpPr>
+          <p:cNvPr id="3" name="Notes Placeholder 2">
+            <a:extLst>
+              <a:ext uri="{FF2B5EF4-FFF2-40B4-BE49-F238E27FC236}">
+                <a16:creationId xmlns:a16="http://schemas.microsoft.com/office/drawing/2014/main" id="{E09FA67B-19AC-E7C6-D29B-7C64A66F0797}"/>
+              </a:ext>
+            </a:extLst>
+          </p:cNvPr>
+          <p:cNvSpPr>
+            <a:spLocks noGrp="1"/>
+          </p:cNvSpPr>
+          <p:nvPr>
+            <p:ph type="body" idx="1"/>
+          </p:nvPr>
+        </p:nvSpPr>
+        <p:spPr/>
+        <p:txBody>
+          <a:bodyPr/>
+          <a:lstStyle/>
+          <a:p>
+            <a:pPr marL="1371600" marR="0" lvl="2" indent="-457200" algn="l" defTabSz="914400" rtl="0" eaLnBrk="1" fontAlgn="auto" latinLnBrk="0" hangingPunct="1">
+              <a:lnSpc>
+                <a:spcPct val="100000"/>
+              </a:lnSpc>
+              <a:spcBef>
+                <a:spcPts val="0"/>
+              </a:spcBef>
+              <a:spcAft>
+                <a:spcPts val="0"/>
+              </a:spcAft>
+              <a:buClrTx/>
+              <a:buSzTx/>
+              <a:buFont typeface="+mj-lt"/>
+              <a:buAutoNum type="alphaLcParenR"/>
+              <a:tabLst/>
+              <a:defRPr/>
+            </a:pPr>
+            <a:r>
+              <a:rPr lang="en-US" b="0" dirty="0"/>
+              <a:t>CD56bright vs. dim NKs: </a:t>
+            </a:r>
+            <a:r>
+              <a:rPr lang="en-US" dirty="0"/>
+              <a:t>hypothesize that CD56bright NKs are promoting </a:t>
+            </a:r>
+            <a:r>
+              <a:rPr lang="en-US" dirty="0" err="1"/>
+              <a:t>irAE</a:t>
+            </a:r>
+            <a:r>
+              <a:rPr lang="en-US" dirty="0"/>
+              <a:t> development, expect to see more cytokine in CD56bright NKs (based on literature) but cytotoxicity may vary depending on activation status</a:t>
+            </a:r>
+            <a:endParaRPr lang="en-US" b="0" dirty="0"/>
+          </a:p>
+          <a:p>
+            <a:pPr marL="1371600" lvl="2" indent="-457200">
+              <a:buFont typeface="+mj-lt"/>
+              <a:buAutoNum type="alphaLcParenR"/>
+            </a:pPr>
+            <a:r>
+              <a:rPr lang="en-US" b="0" dirty="0"/>
+              <a:t>This is  ~pending IMPACD results (would want to see how anything I find there fits in before spending $ here)</a:t>
+            </a:r>
+          </a:p>
+          <a:p>
+            <a:pPr marL="1371600" lvl="2" indent="-457200">
+              <a:buFont typeface="+mj-lt"/>
+              <a:buAutoNum type="alphaLcParenR"/>
+            </a:pPr>
+            <a:r>
+              <a:rPr lang="en-US" b="0" dirty="0"/>
+              <a:t>Analogous to sample choices from </a:t>
+            </a:r>
+            <a:r>
+              <a:rPr lang="en-US" b="0" dirty="0" err="1"/>
+              <a:t>AbATE</a:t>
+            </a:r>
+            <a:endParaRPr lang="en-US" b="0" dirty="0"/>
+          </a:p>
+          <a:p>
+            <a:pPr marL="1371600" lvl="2" indent="-457200">
+              <a:buFont typeface="+mj-lt"/>
+              <a:buAutoNum type="alphaLcParenR"/>
+            </a:pPr>
+            <a:r>
+              <a:rPr lang="en-US" b="0" dirty="0"/>
+              <a:t>If doing </a:t>
+            </a:r>
+            <a:r>
+              <a:rPr lang="en-US" b="0" dirty="0" err="1"/>
+              <a:t>TCRseq</a:t>
+            </a:r>
+            <a:r>
+              <a:rPr lang="en-US" b="0" dirty="0"/>
+              <a:t>, would maybe want to use baseline SCM </a:t>
+            </a:r>
+            <a:r>
+              <a:rPr lang="en-US" b="0" dirty="0" err="1"/>
+              <a:t>freqs</a:t>
+            </a:r>
+            <a:r>
+              <a:rPr lang="en-US" b="0" dirty="0"/>
+              <a:t> </a:t>
+            </a:r>
+            <a:r>
+              <a:rPr lang="en-US" b="0" dirty="0" err="1"/>
+              <a:t>instea</a:t>
+            </a:r>
+            <a:r>
+              <a:rPr lang="en-US" b="0" dirty="0"/>
+              <a:t> to choose samples</a:t>
+            </a:r>
+          </a:p>
+        </p:txBody>
+      </p:sp>
+      <p:sp>
+        <p:nvSpPr>
+          <p:cNvPr id="4" name="Slide Number Placeholder 3">
+            <a:extLst>
+              <a:ext uri="{FF2B5EF4-FFF2-40B4-BE49-F238E27FC236}">
+                <a16:creationId xmlns:a16="http://schemas.microsoft.com/office/drawing/2014/main" id="{F6F07ED9-6F44-9A40-76D1-1DF4D9ECFB7B}"/>
+              </a:ext>
+            </a:extLst>
+          </p:cNvPr>
+          <p:cNvSpPr>
+            <a:spLocks noGrp="1"/>
+          </p:cNvSpPr>
+          <p:nvPr>
+            <p:ph type="sldNum" sz="quarter" idx="5"/>
+          </p:nvPr>
+        </p:nvSpPr>
+        <p:spPr/>
+        <p:txBody>
+          <a:bodyPr/>
+          <a:lstStyle/>
+          <a:p>
+            <a:fld id="{061BAA8C-FDC6-D345-B4E0-3B02449209FB}" type="slidenum">
+              <a:rPr lang="en-US" smtClean="0"/>
+              <a:t>3</a:t>
+            </a:fld>
+            <a:endParaRPr lang="en-US"/>
+          </a:p>
+        </p:txBody>
+      </p:sp>
+    </p:spTree>
+    <p:extLst>
+      <p:ext uri="{BB962C8B-B14F-4D97-AF65-F5344CB8AC3E}">
+        <p14:creationId xmlns:p14="http://schemas.microsoft.com/office/powerpoint/2010/main" val="1443447320"/>
+      </p:ext>
+    </p:extLst>
+  </p:cSld>
+  <p:clrMapOvr>
+    <a:masterClrMapping/>
+  </p:clrMapOvr>
+</p:notes>
+</file>
+
+<file path=ppt/notesSlides/notesSlide4.xml><?xml version="1.0" encoding="utf-8"?>
+<p:notes xmlns:a="http://schemas.openxmlformats.org/drawingml/2006/main" xmlns:r="http://schemas.openxmlformats.org/officeDocument/2006/relationships" xmlns:p="http://schemas.openxmlformats.org/presentationml/2006/main">
+  <p:cSld>
+    <p:spTree>
+      <p:nvGrpSpPr>
+        <p:cNvPr id="1" name="">
+          <a:extLst>
+            <a:ext uri="{FF2B5EF4-FFF2-40B4-BE49-F238E27FC236}">
               <a16:creationId xmlns:a16="http://schemas.microsoft.com/office/drawing/2014/main" id="{4B5935C9-4D9F-4082-DFB9-D827B0D4ADD4}"/>
             </a:ext>
           </a:extLst>
@@ -766,6 +967,16 @@
             </a:pPr>
             <a:r>
               <a:rPr lang="en-US" dirty="0"/>
+              <a:t>Level 1: 1 gate at a time on top of root subset</a:t>
+            </a:r>
+          </a:p>
+          <a:p>
+            <a:pPr marL="1371600" lvl="2" indent="-457200">
+              <a:buFont typeface="+mj-lt"/>
+              <a:buAutoNum type="alphaLcParenR"/>
+            </a:pPr>
+            <a:r>
+              <a:rPr lang="en-US" dirty="0"/>
               <a:t>Batches 10-14 = some additional NCI samples mixed w/ DS, HC</a:t>
             </a:r>
             <a:endParaRPr lang="en-US" b="0" dirty="0"/>
@@ -795,7 +1006,7 @@
           <a:p>
             <a:fld id="{061BAA8C-FDC6-D345-B4E0-3B02449209FB}" type="slidenum">
               <a:rPr lang="en-US" smtClean="0"/>
-              <a:t>3</a:t>
+              <a:t>4</a:t>
             </a:fld>
             <a:endParaRPr lang="en-US"/>
           </a:p>
@@ -814,7 +1025,7 @@
 </p:notes>
 </file>
 
-<file path=ppt/notesSlides/notesSlide4.xml><?xml version="1.0" encoding="utf-8"?>
+<file path=ppt/notesSlides/notesSlide5.xml><?xml version="1.0" encoding="utf-8"?>
 <p:notes xmlns:a="http://schemas.openxmlformats.org/drawingml/2006/main" xmlns:r="http://schemas.openxmlformats.org/officeDocument/2006/relationships" xmlns:p="http://schemas.openxmlformats.org/presentationml/2006/main">
   <p:cSld>
     <p:spTree>
@@ -1003,7 +1214,7 @@
           <a:p>
             <a:fld id="{061BAA8C-FDC6-D345-B4E0-3B02449209FB}" type="slidenum">
               <a:rPr lang="en-US" smtClean="0"/>
-              <a:t>4</a:t>
+              <a:t>5</a:t>
             </a:fld>
             <a:endParaRPr lang="en-US"/>
           </a:p>
@@ -1022,7 +1233,7 @@
 </p:notes>
 </file>
 
-<file path=ppt/notesSlides/notesSlide5.xml><?xml version="1.0" encoding="utf-8"?>
+<file path=ppt/notesSlides/notesSlide6.xml><?xml version="1.0" encoding="utf-8"?>
 <p:notes xmlns:a="http://schemas.openxmlformats.org/drawingml/2006/main" xmlns:r="http://schemas.openxmlformats.org/officeDocument/2006/relationships" xmlns:p="http://schemas.openxmlformats.org/presentationml/2006/main">
   <p:cSld>
     <p:spTree>
@@ -1165,7 +1376,7 @@
           <a:p>
             <a:fld id="{061BAA8C-FDC6-D345-B4E0-3B02449209FB}" type="slidenum">
               <a:rPr lang="en-US" smtClean="0"/>
-              <a:t>5</a:t>
+              <a:t>6</a:t>
             </a:fld>
             <a:endParaRPr lang="en-US"/>
           </a:p>
@@ -1184,7 +1395,7 @@
 </p:notes>
 </file>
 
-<file path=ppt/notesSlides/notesSlide6.xml><?xml version="1.0" encoding="utf-8"?>
+<file path=ppt/notesSlides/notesSlide7.xml><?xml version="1.0" encoding="utf-8"?>
 <p:notes xmlns:a="http://schemas.openxmlformats.org/drawingml/2006/main" xmlns:r="http://schemas.openxmlformats.org/officeDocument/2006/relationships" xmlns:p="http://schemas.openxmlformats.org/presentationml/2006/main">
   <p:cSld>
     <p:spTree>
@@ -1290,7 +1501,7 @@
           <a:p>
             <a:fld id="{061BAA8C-FDC6-D345-B4E0-3B02449209FB}" type="slidenum">
               <a:rPr lang="en-US" smtClean="0"/>
-              <a:t>6</a:t>
+              <a:t>7</a:t>
             </a:fld>
             <a:endParaRPr lang="en-US"/>
           </a:p>
@@ -4720,6 +4931,32 @@
             </a:pPr>
             <a:r>
               <a:rPr lang="en-US" dirty="0"/>
+              <a:t>NCI </a:t>
+            </a:r>
+            <a:r>
+              <a:rPr lang="en-US" dirty="0" err="1"/>
+              <a:t>irAE</a:t>
+            </a:r>
+            <a:r>
+              <a:rPr lang="en-US" dirty="0"/>
+              <a:t> </a:t>
+            </a:r>
+            <a:r>
+              <a:rPr lang="en-US" dirty="0" err="1"/>
+              <a:t>sc</a:t>
+            </a:r>
+            <a:r>
+              <a:rPr lang="en-US" dirty="0"/>
+              <a:t>-seq idea</a:t>
+            </a:r>
+          </a:p>
+          <a:p>
+            <a:pPr marL="514350" indent="-514350">
+              <a:buFont typeface="+mj-lt"/>
+              <a:buAutoNum type="arabicPeriod"/>
+            </a:pPr>
+            <a:r>
+              <a:rPr lang="en-US" dirty="0"/>
               <a:t>IMPACD progress for NCI </a:t>
             </a:r>
             <a:r>
@@ -4762,6 +4999,562 @@
 </file>
 
 <file path=ppt/slides/slide3.xml><?xml version="1.0" encoding="utf-8"?>
+<p:sld xmlns:a="http://schemas.openxmlformats.org/drawingml/2006/main" xmlns:r="http://schemas.openxmlformats.org/officeDocument/2006/relationships" xmlns:p="http://schemas.openxmlformats.org/presentationml/2006/main">
+  <p:cSld>
+    <p:spTree>
+      <p:nvGrpSpPr>
+        <p:cNvPr id="1" name="">
+          <a:extLst>
+            <a:ext uri="{FF2B5EF4-FFF2-40B4-BE49-F238E27FC236}">
+              <a16:creationId xmlns:a16="http://schemas.microsoft.com/office/drawing/2014/main" id="{D365F67D-92D6-3A22-B63B-4CC4D679534B}"/>
+            </a:ext>
+          </a:extLst>
+        </p:cNvPr>
+        <p:cNvGrpSpPr/>
+        <p:nvPr/>
+      </p:nvGrpSpPr>
+      <p:grpSpPr>
+        <a:xfrm>
+          <a:off x="0" y="0"/>
+          <a:ext cx="0" cy="0"/>
+          <a:chOff x="0" y="0"/>
+          <a:chExt cx="0" cy="0"/>
+        </a:xfrm>
+      </p:grpSpPr>
+      <p:sp>
+        <p:nvSpPr>
+          <p:cNvPr id="6" name="Title 5">
+            <a:extLst>
+              <a:ext uri="{FF2B5EF4-FFF2-40B4-BE49-F238E27FC236}">
+                <a16:creationId xmlns:a16="http://schemas.microsoft.com/office/drawing/2014/main" id="{7944950E-0D03-5756-6FBC-88E129C4399A}"/>
+              </a:ext>
+            </a:extLst>
+          </p:cNvPr>
+          <p:cNvSpPr>
+            <a:spLocks noGrp="1"/>
+          </p:cNvSpPr>
+          <p:nvPr>
+            <p:ph type="title"/>
+          </p:nvPr>
+        </p:nvSpPr>
+        <p:spPr>
+          <a:xfrm>
+            <a:off x="838200" y="365125"/>
+            <a:ext cx="10279455" cy="1825625"/>
+          </a:xfrm>
+        </p:spPr>
+        <p:txBody>
+          <a:bodyPr>
+            <a:normAutofit/>
+          </a:bodyPr>
+          <a:lstStyle/>
+          <a:p>
+            <a:r>
+              <a:rPr lang="en-US" dirty="0"/>
+              <a:t>Proposed </a:t>
+            </a:r>
+            <a:r>
+              <a:rPr lang="en-US" dirty="0" err="1"/>
+              <a:t>scRNAseq</a:t>
+            </a:r>
+            <a:r>
+              <a:rPr lang="en-US" dirty="0"/>
+              <a:t> follow up experiment</a:t>
+            </a:r>
+          </a:p>
+        </p:txBody>
+      </p:sp>
+      <p:sp>
+        <p:nvSpPr>
+          <p:cNvPr id="2" name="Content Placeholder 2">
+            <a:extLst>
+              <a:ext uri="{FF2B5EF4-FFF2-40B4-BE49-F238E27FC236}">
+                <a16:creationId xmlns:a16="http://schemas.microsoft.com/office/drawing/2014/main" id="{98E1303A-DA29-8E80-E8EF-68A11F7EB2C0}"/>
+              </a:ext>
+            </a:extLst>
+          </p:cNvPr>
+          <p:cNvSpPr>
+            <a:spLocks noGrp="1"/>
+          </p:cNvSpPr>
+          <p:nvPr>
+            <p:ph idx="1"/>
+          </p:nvPr>
+        </p:nvSpPr>
+        <p:spPr>
+          <a:xfrm>
+            <a:off x="838199" y="1919289"/>
+            <a:ext cx="6887789" cy="4499440"/>
+          </a:xfrm>
+        </p:spPr>
+        <p:txBody>
+          <a:bodyPr>
+            <a:normAutofit/>
+          </a:bodyPr>
+          <a:lstStyle/>
+          <a:p>
+            <a:r>
+              <a:rPr lang="en-US" dirty="0"/>
+              <a:t>n = 4/group (</a:t>
+            </a:r>
+            <a:r>
+              <a:rPr lang="en-US" dirty="0" err="1"/>
+              <a:t>irAE</a:t>
+            </a:r>
+            <a:r>
+              <a:rPr lang="en-US" dirty="0"/>
+              <a:t>, no </a:t>
+            </a:r>
+            <a:r>
+              <a:rPr lang="en-US" dirty="0" err="1"/>
+              <a:t>irAE</a:t>
+            </a:r>
+            <a:r>
+              <a:rPr lang="en-US" dirty="0"/>
+              <a:t>, HC), baseline &amp; 1 post-ICI for cancer samples, 20 samples total</a:t>
+            </a:r>
+          </a:p>
+          <a:p>
+            <a:r>
+              <a:rPr lang="en-US" dirty="0"/>
+              <a:t>Sample choices</a:t>
+            </a:r>
+          </a:p>
+          <a:p>
+            <a:pPr lvl="1"/>
+            <a:r>
+              <a:rPr lang="en-US" dirty="0"/>
+              <a:t>Choose cancer samples based on baseline CD56</a:t>
+            </a:r>
+            <a:r>
+              <a:rPr lang="en-US" baseline="30000" dirty="0"/>
+              <a:t>bright</a:t>
+            </a:r>
+            <a:r>
+              <a:rPr lang="en-US" dirty="0"/>
+              <a:t> NK </a:t>
+            </a:r>
+            <a:r>
+              <a:rPr lang="en-US" dirty="0" err="1"/>
+              <a:t>freqs</a:t>
+            </a:r>
+            <a:r>
+              <a:rPr lang="en-US" dirty="0"/>
+              <a:t> changes w/ ICI</a:t>
+            </a:r>
+          </a:p>
+          <a:p>
+            <a:pPr lvl="1"/>
+            <a:r>
+              <a:rPr lang="en-US" dirty="0"/>
+              <a:t>Choose HCs w/ high range in </a:t>
+            </a:r>
+            <a:r>
+              <a:rPr lang="en-US" dirty="0" err="1"/>
+              <a:t>freq</a:t>
+            </a:r>
+            <a:endParaRPr lang="en-US" dirty="0"/>
+          </a:p>
+          <a:p>
+            <a:r>
+              <a:rPr lang="en-US" dirty="0"/>
+              <a:t>Look for phenotypic differences..</a:t>
+            </a:r>
+          </a:p>
+          <a:p>
+            <a:pPr marL="914400" lvl="1" indent="-457200">
+              <a:buFont typeface="+mj-lt"/>
+              <a:buAutoNum type="arabicPeriod"/>
+            </a:pPr>
+            <a:r>
+              <a:rPr lang="en-US" dirty="0"/>
+              <a:t>b/w CD56</a:t>
+            </a:r>
+            <a:r>
+              <a:rPr lang="en-US" baseline="30000" dirty="0"/>
+              <a:t>bright</a:t>
+            </a:r>
+            <a:r>
+              <a:rPr lang="en-US" dirty="0"/>
+              <a:t> and dim NKs (</a:t>
+            </a:r>
+            <a:r>
+              <a:rPr lang="en-US" dirty="0" err="1"/>
+              <a:t>CITEseq</a:t>
+            </a:r>
+            <a:r>
+              <a:rPr lang="en-US" dirty="0"/>
+              <a:t>?)</a:t>
+            </a:r>
+          </a:p>
+          <a:p>
+            <a:pPr marL="914400" lvl="1" indent="-457200">
+              <a:buFont typeface="+mj-lt"/>
+              <a:buAutoNum type="arabicPeriod"/>
+            </a:pPr>
+            <a:r>
+              <a:rPr lang="en-US" dirty="0"/>
+              <a:t>b/w </a:t>
+            </a:r>
+            <a:r>
+              <a:rPr lang="en-US" dirty="0" err="1"/>
+              <a:t>irAE</a:t>
+            </a:r>
+            <a:r>
+              <a:rPr lang="en-US" dirty="0"/>
+              <a:t> &amp; no </a:t>
+            </a:r>
+            <a:r>
+              <a:rPr lang="en-US" dirty="0" err="1"/>
+              <a:t>irAE</a:t>
+            </a:r>
+            <a:r>
+              <a:rPr lang="en-US" dirty="0"/>
+              <a:t> at baseline/over ICI</a:t>
+            </a:r>
+          </a:p>
+        </p:txBody>
+      </p:sp>
+      <p:pic>
+        <p:nvPicPr>
+          <p:cNvPr id="10" name="Picture 9">
+            <a:extLst>
+              <a:ext uri="{FF2B5EF4-FFF2-40B4-BE49-F238E27FC236}">
+                <a16:creationId xmlns:a16="http://schemas.microsoft.com/office/drawing/2014/main" id="{10913D18-9C7A-7FD5-9DFE-D002B66511EC}"/>
+              </a:ext>
+            </a:extLst>
+          </p:cNvPr>
+          <p:cNvPicPr>
+            <a:picLocks noChangeAspect="1"/>
+          </p:cNvPicPr>
+          <p:nvPr/>
+        </p:nvPicPr>
+        <p:blipFill>
+          <a:blip r:embed="rId3"/>
+          <a:stretch>
+            <a:fillRect/>
+          </a:stretch>
+        </p:blipFill>
+        <p:spPr>
+          <a:xfrm>
+            <a:off x="7649584" y="2379307"/>
+            <a:ext cx="3195434" cy="3573624"/>
+          </a:xfrm>
+          <a:prstGeom prst="rect">
+            <a:avLst/>
+          </a:prstGeom>
+        </p:spPr>
+      </p:pic>
+      <p:pic>
+        <p:nvPicPr>
+          <p:cNvPr id="11" name="Picture 10">
+            <a:extLst>
+              <a:ext uri="{FF2B5EF4-FFF2-40B4-BE49-F238E27FC236}">
+                <a16:creationId xmlns:a16="http://schemas.microsoft.com/office/drawing/2014/main" id="{1922451C-BEEE-E7A1-4413-30A54852CA7B}"/>
+              </a:ext>
+            </a:extLst>
+          </p:cNvPr>
+          <p:cNvPicPr>
+            <a:picLocks noChangeAspect="1"/>
+          </p:cNvPicPr>
+          <p:nvPr/>
+        </p:nvPicPr>
+        <p:blipFill>
+          <a:blip r:embed="rId4"/>
+          <a:stretch>
+            <a:fillRect/>
+          </a:stretch>
+        </p:blipFill>
+        <p:spPr>
+          <a:xfrm>
+            <a:off x="10801884" y="3493699"/>
+            <a:ext cx="1390116" cy="891640"/>
+          </a:xfrm>
+          <a:prstGeom prst="rect">
+            <a:avLst/>
+          </a:prstGeom>
+        </p:spPr>
+      </p:pic>
+      <p:cxnSp>
+        <p:nvCxnSpPr>
+          <p:cNvPr id="13" name="Straight Arrow Connector 12">
+            <a:extLst>
+              <a:ext uri="{FF2B5EF4-FFF2-40B4-BE49-F238E27FC236}">
+                <a16:creationId xmlns:a16="http://schemas.microsoft.com/office/drawing/2014/main" id="{022EEC34-816C-E764-3953-6D9A19134C5A}"/>
+              </a:ext>
+            </a:extLst>
+          </p:cNvPr>
+          <p:cNvCxnSpPr/>
+          <p:nvPr/>
+        </p:nvCxnSpPr>
+        <p:spPr>
+          <a:xfrm>
+            <a:off x="8817151" y="2379307"/>
+            <a:ext cx="233463" cy="986463"/>
+          </a:xfrm>
+          <a:prstGeom prst="straightConnector1">
+            <a:avLst/>
+          </a:prstGeom>
+          <a:ln w="38100">
+            <a:solidFill>
+              <a:schemeClr val="tx1"/>
+            </a:solidFill>
+            <a:tailEnd type="triangle"/>
+          </a:ln>
+        </p:spPr>
+        <p:style>
+          <a:lnRef idx="1">
+            <a:schemeClr val="accent1"/>
+          </a:lnRef>
+          <a:fillRef idx="0">
+            <a:schemeClr val="accent1"/>
+          </a:fillRef>
+          <a:effectRef idx="0">
+            <a:schemeClr val="accent1"/>
+          </a:effectRef>
+          <a:fontRef idx="minor">
+            <a:schemeClr val="tx1"/>
+          </a:fontRef>
+        </p:style>
+      </p:cxnSp>
+      <p:cxnSp>
+        <p:nvCxnSpPr>
+          <p:cNvPr id="14" name="Straight Arrow Connector 13">
+            <a:extLst>
+              <a:ext uri="{FF2B5EF4-FFF2-40B4-BE49-F238E27FC236}">
+                <a16:creationId xmlns:a16="http://schemas.microsoft.com/office/drawing/2014/main" id="{27011E3F-2B90-A169-FD9D-8D2C06CAF9F8}"/>
+              </a:ext>
+            </a:extLst>
+          </p:cNvPr>
+          <p:cNvCxnSpPr>
+            <a:cxnSpLocks/>
+          </p:cNvCxnSpPr>
+          <p:nvPr/>
+        </p:nvCxnSpPr>
+        <p:spPr>
+          <a:xfrm flipV="1">
+            <a:off x="8834660" y="4513634"/>
+            <a:ext cx="198444" cy="856034"/>
+          </a:xfrm>
+          <a:prstGeom prst="straightConnector1">
+            <a:avLst/>
+          </a:prstGeom>
+          <a:ln w="38100">
+            <a:solidFill>
+              <a:schemeClr val="tx1"/>
+            </a:solidFill>
+            <a:tailEnd type="triangle"/>
+          </a:ln>
+        </p:spPr>
+        <p:style>
+          <a:lnRef idx="1">
+            <a:schemeClr val="accent1"/>
+          </a:lnRef>
+          <a:fillRef idx="0">
+            <a:schemeClr val="accent1"/>
+          </a:fillRef>
+          <a:effectRef idx="0">
+            <a:schemeClr val="accent1"/>
+          </a:effectRef>
+          <a:fontRef idx="minor">
+            <a:schemeClr val="tx1"/>
+          </a:fontRef>
+        </p:style>
+      </p:cxnSp>
+      <p:sp>
+        <p:nvSpPr>
+          <p:cNvPr id="17" name="TextBox 16">
+            <a:extLst>
+              <a:ext uri="{FF2B5EF4-FFF2-40B4-BE49-F238E27FC236}">
+                <a16:creationId xmlns:a16="http://schemas.microsoft.com/office/drawing/2014/main" id="{A2CE80EA-D8A7-0A4E-E512-3A56651783FD}"/>
+              </a:ext>
+            </a:extLst>
+          </p:cNvPr>
+          <p:cNvSpPr txBox="1"/>
+          <p:nvPr/>
+        </p:nvSpPr>
+        <p:spPr>
+          <a:xfrm>
+            <a:off x="8519391" y="1785599"/>
+            <a:ext cx="2977551" cy="646331"/>
+          </a:xfrm>
+          <a:prstGeom prst="rect">
+            <a:avLst/>
+          </a:prstGeom>
+          <a:noFill/>
+        </p:spPr>
+        <p:txBody>
+          <a:bodyPr wrap="square" rtlCol="0">
+            <a:spAutoFit/>
+          </a:bodyPr>
+          <a:lstStyle/>
+          <a:p>
+            <a:r>
+              <a:rPr lang="en-US" dirty="0"/>
+              <a:t>n = 4 from </a:t>
+            </a:r>
+            <a:r>
+              <a:rPr lang="en-US" dirty="0" err="1"/>
+              <a:t>irAE</a:t>
+            </a:r>
+            <a:r>
+              <a:rPr lang="en-US" dirty="0"/>
+              <a:t> group (with steep decline in </a:t>
+            </a:r>
+            <a:r>
+              <a:rPr lang="en-US" dirty="0" err="1"/>
+              <a:t>freq</a:t>
+            </a:r>
+            <a:r>
+              <a:rPr lang="en-US" dirty="0"/>
+              <a:t> over ICI)</a:t>
+            </a:r>
+          </a:p>
+        </p:txBody>
+      </p:sp>
+      <p:sp>
+        <p:nvSpPr>
+          <p:cNvPr id="18" name="TextBox 17">
+            <a:extLst>
+              <a:ext uri="{FF2B5EF4-FFF2-40B4-BE49-F238E27FC236}">
+                <a16:creationId xmlns:a16="http://schemas.microsoft.com/office/drawing/2014/main" id="{8BDAD0DE-A864-B69E-3B88-4459DCCEEC51}"/>
+              </a:ext>
+            </a:extLst>
+          </p:cNvPr>
+          <p:cNvSpPr txBox="1"/>
+          <p:nvPr/>
+        </p:nvSpPr>
+        <p:spPr>
+          <a:xfrm>
+            <a:off x="7384189" y="5369668"/>
+            <a:ext cx="2156626" cy="923330"/>
+          </a:xfrm>
+          <a:prstGeom prst="rect">
+            <a:avLst/>
+          </a:prstGeom>
+          <a:noFill/>
+        </p:spPr>
+        <p:txBody>
+          <a:bodyPr wrap="square" rtlCol="0">
+            <a:spAutoFit/>
+          </a:bodyPr>
+          <a:lstStyle/>
+          <a:p>
+            <a:r>
+              <a:rPr lang="en-US" dirty="0"/>
+              <a:t>n = 4 from no-</a:t>
+            </a:r>
+            <a:r>
+              <a:rPr lang="en-US" dirty="0" err="1"/>
+              <a:t>irAE</a:t>
+            </a:r>
+            <a:r>
+              <a:rPr lang="en-US" dirty="0"/>
+              <a:t> group (with low baseline </a:t>
+            </a:r>
+            <a:r>
+              <a:rPr lang="en-US" dirty="0" err="1"/>
+              <a:t>freq</a:t>
+            </a:r>
+            <a:r>
+              <a:rPr lang="en-US" dirty="0"/>
+              <a:t>)</a:t>
+            </a:r>
+          </a:p>
+        </p:txBody>
+      </p:sp>
+      <p:cxnSp>
+        <p:nvCxnSpPr>
+          <p:cNvPr id="19" name="Straight Arrow Connector 18">
+            <a:extLst>
+              <a:ext uri="{FF2B5EF4-FFF2-40B4-BE49-F238E27FC236}">
+                <a16:creationId xmlns:a16="http://schemas.microsoft.com/office/drawing/2014/main" id="{5E62F464-526B-FB26-0A88-B30A5142853A}"/>
+              </a:ext>
+            </a:extLst>
+          </p:cNvPr>
+          <p:cNvCxnSpPr>
+            <a:cxnSpLocks/>
+          </p:cNvCxnSpPr>
+          <p:nvPr/>
+        </p:nvCxnSpPr>
+        <p:spPr>
+          <a:xfrm flipH="1">
+            <a:off x="9540815" y="3114136"/>
+            <a:ext cx="1576840" cy="868371"/>
+          </a:xfrm>
+          <a:prstGeom prst="straightConnector1">
+            <a:avLst/>
+          </a:prstGeom>
+          <a:ln w="38100">
+            <a:solidFill>
+              <a:schemeClr val="tx1"/>
+            </a:solidFill>
+            <a:tailEnd type="triangle"/>
+          </a:ln>
+        </p:spPr>
+        <p:style>
+          <a:lnRef idx="1">
+            <a:schemeClr val="accent1"/>
+          </a:lnRef>
+          <a:fillRef idx="0">
+            <a:schemeClr val="accent1"/>
+          </a:fillRef>
+          <a:effectRef idx="0">
+            <a:schemeClr val="accent1"/>
+          </a:effectRef>
+          <a:fontRef idx="minor">
+            <a:schemeClr val="tx1"/>
+          </a:fontRef>
+        </p:style>
+      </p:cxnSp>
+      <p:sp>
+        <p:nvSpPr>
+          <p:cNvPr id="22" name="TextBox 21">
+            <a:extLst>
+              <a:ext uri="{FF2B5EF4-FFF2-40B4-BE49-F238E27FC236}">
+                <a16:creationId xmlns:a16="http://schemas.microsoft.com/office/drawing/2014/main" id="{3500A5DE-4C80-36B7-7208-23879177D252}"/>
+              </a:ext>
+            </a:extLst>
+          </p:cNvPr>
+          <p:cNvSpPr txBox="1"/>
+          <p:nvPr/>
+        </p:nvSpPr>
+        <p:spPr>
+          <a:xfrm>
+            <a:off x="10850941" y="2484554"/>
+            <a:ext cx="1176274" cy="646331"/>
+          </a:xfrm>
+          <a:prstGeom prst="rect">
+            <a:avLst/>
+          </a:prstGeom>
+          <a:noFill/>
+        </p:spPr>
+        <p:txBody>
+          <a:bodyPr wrap="square" rtlCol="0">
+            <a:spAutoFit/>
+          </a:bodyPr>
+          <a:lstStyle/>
+          <a:p>
+            <a:r>
+              <a:rPr lang="en-US" dirty="0"/>
+              <a:t>post-ICI timepoint</a:t>
+            </a:r>
+          </a:p>
+        </p:txBody>
+      </p:sp>
+    </p:spTree>
+    <p:extLst>
+      <p:ext uri="{BB962C8B-B14F-4D97-AF65-F5344CB8AC3E}">
+        <p14:creationId xmlns:p14="http://schemas.microsoft.com/office/powerpoint/2010/main" val="3854961941"/>
+      </p:ext>
+    </p:extLst>
+  </p:cSld>
+  <p:clrMapOvr>
+    <a:masterClrMapping/>
+  </p:clrMapOvr>
+</p:sld>
+</file>
+
+<file path=ppt/slides/slide4.xml><?xml version="1.0" encoding="utf-8"?>
 <p:sld xmlns:a="http://schemas.openxmlformats.org/drawingml/2006/main" xmlns:r="http://schemas.openxmlformats.org/officeDocument/2006/relationships" xmlns:p="http://schemas.openxmlformats.org/presentationml/2006/main">
   <p:cSld>
     <p:spTree>
@@ -4847,51 +5640,48 @@
           </a:bodyPr>
           <a:lstStyle/>
           <a:p>
-            <a:pPr marL="514350" indent="-514350">
+            <a:r>
+              <a:rPr lang="en-US" dirty="0"/>
+              <a:t>Can run level 1 &amp; level 2 (modifier) analyses on any parent subset of interest</a:t>
+            </a:r>
+          </a:p>
+          <a:p>
+            <a:r>
+              <a:rPr lang="en-US" dirty="0"/>
+              <a:t>No baseline combined </a:t>
+            </a:r>
+            <a:r>
+              <a:rPr lang="en-US" dirty="0" err="1"/>
+              <a:t>irAE</a:t>
+            </a:r>
+            <a:r>
+              <a:rPr lang="en-US" dirty="0"/>
+              <a:t> group differences (FDR &lt; 0.1) so far</a:t>
+            </a:r>
+          </a:p>
+          <a:p>
+            <a:r>
+              <a:rPr lang="en-US" dirty="0"/>
+              <a:t>Next steps</a:t>
+            </a:r>
+          </a:p>
+          <a:p>
+            <a:pPr marL="914400" lvl="1" indent="-457200">
               <a:buFont typeface="+mj-lt"/>
               <a:buAutoNum type="arabicPeriod"/>
             </a:pPr>
             <a:r>
               <a:rPr lang="en-US" dirty="0"/>
-              <a:t>Able to do level 1 (1 gate on top of parent root) &amp; level 2 (modifier) analyses on any parent subset of interest</a:t>
-            </a:r>
-          </a:p>
-          <a:p>
-            <a:pPr lvl="1"/>
-            <a:r>
-              <a:rPr lang="en-US" dirty="0"/>
-              <a:t>No baseline combined </a:t>
-            </a:r>
-            <a:r>
-              <a:rPr lang="en-US" dirty="0" err="1"/>
-              <a:t>irAE</a:t>
-            </a:r>
-            <a:r>
-              <a:rPr lang="en-US" dirty="0"/>
-              <a:t> group differences (FDR &lt; 0.05) yet</a:t>
-            </a:r>
-          </a:p>
-          <a:p>
-            <a:pPr marL="514350" indent="-514350">
+              <a:t>Choose relevant markers to examine subsets</a:t>
+            </a:r>
+          </a:p>
+          <a:p>
+            <a:pPr marL="914400" lvl="1" indent="-457200">
               <a:buFont typeface="+mj-lt"/>
               <a:buAutoNum type="arabicPeriod"/>
             </a:pPr>
             <a:r>
               <a:rPr lang="en-US" dirty="0"/>
-              <a:t>Next steps</a:t>
-            </a:r>
-          </a:p>
-          <a:p>
-            <a:pPr lvl="1"/>
-            <a:r>
-              <a:rPr lang="en-US" dirty="0"/>
-              <a:t>Decide what subsets and relevant markers to interrogate (computationally intensive to use all markers for level 2 analysis)</a:t>
-            </a:r>
-          </a:p>
-          <a:p>
-            <a:pPr lvl="1"/>
-            <a:r>
-              <a:rPr lang="en-US" dirty="0"/>
               <a:t>Look at specific </a:t>
             </a:r>
             <a:r>
@@ -4904,18 +5694,13 @@
             </a:r>
           </a:p>
           <a:p>
-            <a:pPr lvl="1"/>
+            <a:pPr marL="914400" lvl="1" indent="-457200">
+              <a:buFont typeface="+mj-lt"/>
+              <a:buAutoNum type="arabicPeriod"/>
+            </a:pPr>
             <a:r>
               <a:rPr lang="en-US" dirty="0"/>
-              <a:t>Add in 4 additional batches of samples into workflows (IMPACD &amp; previous work on % parent </a:t>
-            </a:r>
-            <a:r>
-              <a:rPr lang="en-US" dirty="0" err="1"/>
-              <a:t>freq</a:t>
-            </a:r>
-            <a:r>
-              <a:rPr lang="en-US" dirty="0"/>
-              <a:t> comparisons)</a:t>
+              <a:t>Add in 4 additional batches of samples into workflows</a:t>
             </a:r>
           </a:p>
         </p:txBody>
@@ -4933,7 +5718,7 @@
 </p:sld>
 </file>
 
-<file path=ppt/slides/slide4.xml><?xml version="1.0" encoding="utf-8"?>
+<file path=ppt/slides/slide5.xml><?xml version="1.0" encoding="utf-8"?>
 <p:sld xmlns:a="http://schemas.openxmlformats.org/drawingml/2006/main" xmlns:r="http://schemas.openxmlformats.org/officeDocument/2006/relationships" xmlns:p="http://schemas.openxmlformats.org/presentationml/2006/main">
   <p:cSld>
     <p:spTree>
@@ -5077,7 +5862,7 @@
 </p:sld>
 </file>
 
-<file path=ppt/slides/slide5.xml><?xml version="1.0" encoding="utf-8"?>
+<file path=ppt/slides/slide6.xml><?xml version="1.0" encoding="utf-8"?>
 <p:sld xmlns:a="http://schemas.openxmlformats.org/drawingml/2006/main" xmlns:r="http://schemas.openxmlformats.org/officeDocument/2006/relationships" xmlns:p="http://schemas.openxmlformats.org/presentationml/2006/main">
   <p:cSld>
     <p:spTree>
@@ -5213,7 +5998,7 @@
 </p:sld>
 </file>
 
-<file path=ppt/slides/slide6.xml><?xml version="1.0" encoding="utf-8"?>
+<file path=ppt/slides/slide7.xml><?xml version="1.0" encoding="utf-8"?>
 <p:sld xmlns:a="http://schemas.openxmlformats.org/drawingml/2006/main" xmlns:r="http://schemas.openxmlformats.org/officeDocument/2006/relationships" xmlns:p="http://schemas.openxmlformats.org/presentationml/2006/main">
   <p:cSld>
     <p:spTree>

</xml_diff>